<commit_message>
inor change to interp section
</commit_message>
<xml_diff>
--- a/Report/AI.pptx
+++ b/Report/AI.pptx
@@ -212,7 +212,7 @@
             <a:fld id="{754ACA1A-A7CA-4A28-8CE1-9A04B3D1DDE3}" type="datetimeFigureOut">
               <a:rPr lang="fr-FR" smtClean="0"/>
               <a:pPr/>
-              <a:t>20/05/2014</a:t>
+              <a:t>21/05/2014</a:t>
             </a:fld>
             <a:endParaRPr lang="fr-FR"/>
           </a:p>
@@ -383,7 +383,7 @@
     </p:spTree>
     <p:extLst>
       <p:ext uri="{BB962C8B-B14F-4D97-AF65-F5344CB8AC3E}">
-        <p14:creationId xmlns="" xmlns:p14="http://schemas.microsoft.com/office/powerpoint/2010/main" val="3535397208"/>
+        <p14:creationId xmlns:p14="http://schemas.microsoft.com/office/powerpoint/2010/main" val="3535397208"/>
       </p:ext>
     </p:extLst>
   </p:cSld>
@@ -512,7 +512,7 @@
           <a:blip r:embed="rId2" cstate="print">
             <a:extLst>
               <a:ext uri="{28A0092B-C50C-407E-A947-70E740481C1C}">
-                <a14:useLocalDpi xmlns="" xmlns:a14="http://schemas.microsoft.com/office/drawing/2010/main" val="0"/>
+                <a14:useLocalDpi xmlns:a14="http://schemas.microsoft.com/office/drawing/2010/main" val="0"/>
               </a:ext>
             </a:extLst>
           </a:blip>
@@ -535,14 +535,14 @@
           </a:ln>
           <a:extLst>
             <a:ext uri="{909E8E84-426E-40DD-AFC4-6F175D3DCCD1}">
-              <a14:hiddenFill xmlns="" xmlns:a14="http://schemas.microsoft.com/office/drawing/2010/main">
+              <a14:hiddenFill xmlns:a14="http://schemas.microsoft.com/office/drawing/2010/main">
                 <a:solidFill>
                   <a:srgbClr val="FFFFFF"/>
                 </a:solidFill>
               </a14:hiddenFill>
             </a:ext>
             <a:ext uri="{91240B29-F687-4F45-9708-019B960494DF}">
-              <a14:hiddenLine xmlns="" xmlns:a14="http://schemas.microsoft.com/office/drawing/2010/main" w="9525">
+              <a14:hiddenLine xmlns:a14="http://schemas.microsoft.com/office/drawing/2010/main" w="9525">
                 <a:solidFill>
                   <a:srgbClr val="000000"/>
                 </a:solidFill>
@@ -590,7 +590,7 @@
           <a:effectLst/>
           <a:extLst>
             <a:ext uri="{91240B29-F687-4F45-9708-019B960494DF}">
-              <a14:hiddenLine xmlns="" xmlns:a14="http://schemas.microsoft.com/office/drawing/2010/main" w="9525">
+              <a14:hiddenLine xmlns:a14="http://schemas.microsoft.com/office/drawing/2010/main" w="9525">
                 <a:solidFill>
                   <a:schemeClr val="tx1"/>
                 </a:solidFill>
@@ -600,7 +600,7 @@
               </a14:hiddenLine>
             </a:ext>
             <a:ext uri="{AF507438-7753-43E0-B8FC-AC1667EBCBE1}">
-              <a14:hiddenEffects xmlns="" xmlns:a14="http://schemas.microsoft.com/office/drawing/2010/main">
+              <a14:hiddenEffects xmlns:a14="http://schemas.microsoft.com/office/drawing/2010/main">
                 <a:effectLst>
                   <a:outerShdw dist="35921" dir="2700000" algn="ctr" rotWithShape="0">
                     <a:schemeClr val="bg2"/>
@@ -635,14 +635,14 @@
           </a:xfrm>
           <a:extLst>
             <a:ext uri="{909E8E84-426E-40DD-AFC4-6F175D3DCCD1}">
-              <a14:hiddenFill xmlns="" xmlns:a14="http://schemas.microsoft.com/office/drawing/2010/main">
+              <a14:hiddenFill xmlns:a14="http://schemas.microsoft.com/office/drawing/2010/main">
                 <a:solidFill>
                   <a:schemeClr val="accent1"/>
                 </a:solidFill>
               </a14:hiddenFill>
             </a:ext>
             <a:ext uri="{91240B29-F687-4F45-9708-019B960494DF}">
-              <a14:hiddenLine xmlns="" xmlns:a14="http://schemas.microsoft.com/office/drawing/2010/main" w="9525">
+              <a14:hiddenLine xmlns:a14="http://schemas.microsoft.com/office/drawing/2010/main" w="9525">
                 <a:solidFill>
                   <a:schemeClr val="tx1"/>
                 </a:solidFill>
@@ -652,7 +652,7 @@
               </a14:hiddenLine>
             </a:ext>
             <a:ext uri="{AF507438-7753-43E0-B8FC-AC1667EBCBE1}">
-              <a14:hiddenEffects xmlns="" xmlns:a14="http://schemas.microsoft.com/office/drawing/2010/main">
+              <a14:hiddenEffects xmlns:a14="http://schemas.microsoft.com/office/drawing/2010/main">
                 <a:effectLst>
                   <a:outerShdw dist="35921" dir="2700000" algn="ctr" rotWithShape="0">
                     <a:schemeClr val="bg2"/>
@@ -700,14 +700,14 @@
           </a:xfrm>
           <a:extLst>
             <a:ext uri="{909E8E84-426E-40DD-AFC4-6F175D3DCCD1}">
-              <a14:hiddenFill xmlns="" xmlns:a14="http://schemas.microsoft.com/office/drawing/2010/main">
+              <a14:hiddenFill xmlns:a14="http://schemas.microsoft.com/office/drawing/2010/main">
                 <a:solidFill>
                   <a:schemeClr val="accent1"/>
                 </a:solidFill>
               </a14:hiddenFill>
             </a:ext>
             <a:ext uri="{91240B29-F687-4F45-9708-019B960494DF}">
-              <a14:hiddenLine xmlns="" xmlns:a14="http://schemas.microsoft.com/office/drawing/2010/main" w="9525">
+              <a14:hiddenLine xmlns:a14="http://schemas.microsoft.com/office/drawing/2010/main" w="9525">
                 <a:solidFill>
                   <a:schemeClr val="tx1"/>
                 </a:solidFill>
@@ -740,7 +740,7 @@
     </p:spTree>
     <p:extLst>
       <p:ext uri="{BB962C8B-B14F-4D97-AF65-F5344CB8AC3E}">
-        <p14:creationId xmlns="" xmlns:p14="http://schemas.microsoft.com/office/powerpoint/2010/main" val="1724044781"/>
+        <p14:creationId xmlns:p14="http://schemas.microsoft.com/office/powerpoint/2010/main" val="1724044781"/>
       </p:ext>
     </p:extLst>
   </p:cSld>
@@ -878,7 +878,7 @@
     </p:spTree>
     <p:extLst>
       <p:ext uri="{BB962C8B-B14F-4D97-AF65-F5344CB8AC3E}">
-        <p14:creationId xmlns="" xmlns:p14="http://schemas.microsoft.com/office/powerpoint/2010/main" val="1860755746"/>
+        <p14:creationId xmlns:p14="http://schemas.microsoft.com/office/powerpoint/2010/main" val="1860755746"/>
       </p:ext>
     </p:extLst>
   </p:cSld>
@@ -1134,7 +1134,7 @@
     </p:spTree>
     <p:extLst>
       <p:ext uri="{BB962C8B-B14F-4D97-AF65-F5344CB8AC3E}">
-        <p14:creationId xmlns="" xmlns:p14="http://schemas.microsoft.com/office/powerpoint/2010/main" val="3435413785"/>
+        <p14:creationId xmlns:p14="http://schemas.microsoft.com/office/powerpoint/2010/main" val="3435413785"/>
       </p:ext>
     </p:extLst>
   </p:cSld>
@@ -1220,7 +1220,7 @@
     </p:spTree>
     <p:extLst>
       <p:ext uri="{BB962C8B-B14F-4D97-AF65-F5344CB8AC3E}">
-        <p14:creationId xmlns="" xmlns:p14="http://schemas.microsoft.com/office/powerpoint/2010/main" val="1122840971"/>
+        <p14:creationId xmlns:p14="http://schemas.microsoft.com/office/powerpoint/2010/main" val="1122840971"/>
       </p:ext>
     </p:extLst>
   </p:cSld>
@@ -1430,7 +1430,7 @@
             <a:fld id="{9AB09DB4-46DD-43C5-AC9F-19D2F9D5F930}" type="datetimeFigureOut">
               <a:rPr lang="fr-FR" smtClean="0"/>
               <a:pPr/>
-              <a:t>20/05/2014</a:t>
+              <a:t>21/05/2014</a:t>
             </a:fld>
             <a:endParaRPr lang="fr-FR"/>
           </a:p>
@@ -1545,7 +1545,7 @@
           <a:effectLst/>
           <a:extLst>
             <a:ext uri="{91240B29-F687-4F45-9708-019B960494DF}">
-              <a14:hiddenLine xmlns="" xmlns:a14="http://schemas.microsoft.com/office/drawing/2010/main" w="9525">
+              <a14:hiddenLine xmlns:a14="http://schemas.microsoft.com/office/drawing/2010/main" w="9525">
                 <a:solidFill>
                   <a:srgbClr val="FFFFFF"/>
                 </a:solidFill>
@@ -1555,7 +1555,7 @@
               </a14:hiddenLine>
             </a:ext>
             <a:ext uri="{AF507438-7753-43E0-B8FC-AC1667EBCBE1}">
-              <a14:hiddenEffects xmlns="" xmlns:a14="http://schemas.microsoft.com/office/drawing/2010/main">
+              <a14:hiddenEffects xmlns:a14="http://schemas.microsoft.com/office/drawing/2010/main">
                 <a:effectLst>
                   <a:outerShdw dist="35921" dir="2700000" algn="ctr" rotWithShape="0">
                     <a:srgbClr val="808080"/>
@@ -1602,14 +1602,14 @@
           <a:effectLst/>
           <a:extLst>
             <a:ext uri="{909E8E84-426E-40DD-AFC4-6F175D3DCCD1}">
-              <a14:hiddenFill xmlns="" xmlns:a14="http://schemas.microsoft.com/office/drawing/2010/main">
+              <a14:hiddenFill xmlns:a14="http://schemas.microsoft.com/office/drawing/2010/main">
                 <a:solidFill>
                   <a:srgbClr val="00477F"/>
                 </a:solidFill>
               </a14:hiddenFill>
             </a:ext>
             <a:ext uri="{91240B29-F687-4F45-9708-019B960494DF}">
-              <a14:hiddenLine xmlns="" xmlns:a14="http://schemas.microsoft.com/office/drawing/2010/main" w="9525">
+              <a14:hiddenLine xmlns:a14="http://schemas.microsoft.com/office/drawing/2010/main" w="9525">
                 <a:solidFill>
                   <a:srgbClr val="35024A"/>
                 </a:solidFill>
@@ -1619,7 +1619,7 @@
               </a14:hiddenLine>
             </a:ext>
             <a:ext uri="{AF507438-7753-43E0-B8FC-AC1667EBCBE1}">
-              <a14:hiddenEffects xmlns="" xmlns:a14="http://schemas.microsoft.com/office/drawing/2010/main">
+              <a14:hiddenEffects xmlns:a14="http://schemas.microsoft.com/office/drawing/2010/main">
                 <a:effectLst>
                   <a:outerShdw dist="35921" dir="2700000" algn="ctr" rotWithShape="0">
                     <a:srgbClr val="808080"/>
@@ -1670,14 +1670,14 @@
           <a:effectLst/>
           <a:extLst>
             <a:ext uri="{909E8E84-426E-40DD-AFC4-6F175D3DCCD1}">
-              <a14:hiddenFill xmlns="" xmlns:a14="http://schemas.microsoft.com/office/drawing/2010/main">
+              <a14:hiddenFill xmlns:a14="http://schemas.microsoft.com/office/drawing/2010/main">
                 <a:solidFill>
                   <a:srgbClr val="C0C0C0"/>
                 </a:solidFill>
               </a14:hiddenFill>
             </a:ext>
             <a:ext uri="{91240B29-F687-4F45-9708-019B960494DF}">
-              <a14:hiddenLine xmlns="" xmlns:a14="http://schemas.microsoft.com/office/drawing/2010/main" w="9525">
+              <a14:hiddenLine xmlns:a14="http://schemas.microsoft.com/office/drawing/2010/main" w="9525">
                 <a:solidFill>
                   <a:srgbClr val="5F5F5F"/>
                 </a:solidFill>
@@ -1687,7 +1687,7 @@
               </a14:hiddenLine>
             </a:ext>
             <a:ext uri="{AF507438-7753-43E0-B8FC-AC1667EBCBE1}">
-              <a14:hiddenEffects xmlns="" xmlns:a14="http://schemas.microsoft.com/office/drawing/2010/main">
+              <a14:hiddenEffects xmlns:a14="http://schemas.microsoft.com/office/drawing/2010/main">
                 <a:effectLst>
                   <a:outerShdw dist="35921" dir="2700000" algn="ctr" rotWithShape="0">
                     <a:schemeClr val="bg2"/>
@@ -1766,14 +1766,14 @@
           <a:effectLst/>
           <a:extLst>
             <a:ext uri="{909E8E84-426E-40DD-AFC4-6F175D3DCCD1}">
-              <a14:hiddenFill xmlns="" xmlns:a14="http://schemas.microsoft.com/office/drawing/2010/main">
+              <a14:hiddenFill xmlns:a14="http://schemas.microsoft.com/office/drawing/2010/main">
                 <a:solidFill>
                   <a:schemeClr val="accent1"/>
                 </a:solidFill>
               </a14:hiddenFill>
             </a:ext>
             <a:ext uri="{91240B29-F687-4F45-9708-019B960494DF}">
-              <a14:hiddenLine xmlns="" xmlns:a14="http://schemas.microsoft.com/office/drawing/2010/main" w="9525">
+              <a14:hiddenLine xmlns:a14="http://schemas.microsoft.com/office/drawing/2010/main" w="9525">
                 <a:solidFill>
                   <a:schemeClr val="tx1"/>
                 </a:solidFill>
@@ -1783,7 +1783,7 @@
               </a14:hiddenLine>
             </a:ext>
             <a:ext uri="{AF507438-7753-43E0-B8FC-AC1667EBCBE1}">
-              <a14:hiddenEffects xmlns="" xmlns:a14="http://schemas.microsoft.com/office/drawing/2010/main">
+              <a14:hiddenEffects xmlns:a14="http://schemas.microsoft.com/office/drawing/2010/main">
                 <a:effectLst>
                   <a:outerShdw dist="35921" dir="2700000" algn="ctr" rotWithShape="0">
                     <a:schemeClr val="bg2"/>
@@ -1837,14 +1837,14 @@
           <a:effectLst/>
           <a:extLst>
             <a:ext uri="{909E8E84-426E-40DD-AFC4-6F175D3DCCD1}">
-              <a14:hiddenFill xmlns="" xmlns:a14="http://schemas.microsoft.com/office/drawing/2010/main">
+              <a14:hiddenFill xmlns:a14="http://schemas.microsoft.com/office/drawing/2010/main">
                 <a:solidFill>
                   <a:srgbClr val="C0C0C0"/>
                 </a:solidFill>
               </a14:hiddenFill>
             </a:ext>
             <a:ext uri="{91240B29-F687-4F45-9708-019B960494DF}">
-              <a14:hiddenLine xmlns="" xmlns:a14="http://schemas.microsoft.com/office/drawing/2010/main" w="9525">
+              <a14:hiddenLine xmlns:a14="http://schemas.microsoft.com/office/drawing/2010/main" w="9525">
                 <a:solidFill>
                   <a:srgbClr val="5F5F5F"/>
                 </a:solidFill>
@@ -1854,7 +1854,7 @@
               </a14:hiddenLine>
             </a:ext>
             <a:ext uri="{AF507438-7753-43E0-B8FC-AC1667EBCBE1}">
-              <a14:hiddenEffects xmlns="" xmlns:a14="http://schemas.microsoft.com/office/drawing/2010/main">
+              <a14:hiddenEffects xmlns:a14="http://schemas.microsoft.com/office/drawing/2010/main">
                 <a:effectLst>
                   <a:outerShdw dist="35921" dir="2700000" algn="ctr" rotWithShape="0">
                     <a:schemeClr val="bg2"/>
@@ -2561,7 +2561,15 @@
           <a:p>
             <a:r>
               <a:rPr lang="en-GB" sz="2000" dirty="0" smtClean="0"/>
-              <a:t>Further, we have some rules to see if an object is e.g. besides any other object </a:t>
+              <a:t>Further, we have some rules to see if an object is e.g. </a:t>
+            </a:r>
+            <a:r>
+              <a:rPr lang="en-GB" sz="2000" dirty="0" smtClean="0"/>
+              <a:t>beside </a:t>
+            </a:r>
+            <a:r>
+              <a:rPr lang="en-GB" sz="2000" dirty="0" smtClean="0"/>
+              <a:t>any other object </a:t>
             </a:r>
             <a:endParaRPr lang="en-GB" sz="2000" dirty="0"/>
           </a:p>
@@ -2668,7 +2676,7 @@
     </p:spTree>
     <p:extLst>
       <p:ext uri="{BB962C8B-B14F-4D97-AF65-F5344CB8AC3E}">
-        <p14:creationId xmlns="" xmlns:p14="http://schemas.microsoft.com/office/powerpoint/2010/main" val="699135888"/>
+        <p14:creationId xmlns:p14="http://schemas.microsoft.com/office/powerpoint/2010/main" val="699135888"/>
       </p:ext>
     </p:extLst>
   </p:cSld>
@@ -3228,7 +3236,7 @@
     </p:custDataLst>
     <p:extLst>
       <p:ext uri="{BB962C8B-B14F-4D97-AF65-F5344CB8AC3E}">
-        <p14:creationId xmlns="" xmlns:p14="http://schemas.microsoft.com/office/powerpoint/2010/main" val="195894452"/>
+        <p14:creationId xmlns:p14="http://schemas.microsoft.com/office/powerpoint/2010/main" val="195894452"/>
       </p:ext>
     </p:extLst>
   </p:cSld>
@@ -4060,7 +4068,7 @@
     </p:spTree>
     <p:extLst>
       <p:ext uri="{BB962C8B-B14F-4D97-AF65-F5344CB8AC3E}">
-        <p14:creationId xmlns="" xmlns:p14="http://schemas.microsoft.com/office/powerpoint/2010/main" val="1658291248"/>
+        <p14:creationId xmlns:p14="http://schemas.microsoft.com/office/powerpoint/2010/main" val="1658291248"/>
       </p:ext>
     </p:extLst>
   </p:cSld>
@@ -4540,7 +4548,7 @@
     </p:custDataLst>
     <p:extLst>
       <p:ext uri="{BB962C8B-B14F-4D97-AF65-F5344CB8AC3E}">
-        <p14:creationId xmlns="" xmlns:p14="http://schemas.microsoft.com/office/powerpoint/2010/main" val="2855133909"/>
+        <p14:creationId xmlns:p14="http://schemas.microsoft.com/office/powerpoint/2010/main" val="2855133909"/>
       </p:ext>
     </p:extLst>
   </p:cSld>
@@ -4692,14 +4700,14 @@
           <a:effectLst/>
           <a:extLst>
             <a:ext uri="{909E8E84-426E-40DD-AFC4-6F175D3DCCD1}">
-              <a14:hiddenFill xmlns="" xmlns:a14="http://schemas.microsoft.com/office/drawing/2010/main">
+              <a14:hiddenFill xmlns:a14="http://schemas.microsoft.com/office/drawing/2010/main">
                 <a:solidFill>
                   <a:srgbClr val="C0C0C0"/>
                 </a:solidFill>
               </a14:hiddenFill>
             </a:ext>
             <a:ext uri="{91240B29-F687-4F45-9708-019B960494DF}">
-              <a14:hiddenLine xmlns="" xmlns:a14="http://schemas.microsoft.com/office/drawing/2010/main" w="9525">
+              <a14:hiddenLine xmlns:a14="http://schemas.microsoft.com/office/drawing/2010/main" w="9525">
                 <a:solidFill>
                   <a:srgbClr val="5F5F5F"/>
                 </a:solidFill>
@@ -4709,7 +4717,7 @@
               </a14:hiddenLine>
             </a:ext>
             <a:ext uri="{AF507438-7753-43E0-B8FC-AC1667EBCBE1}">
-              <a14:hiddenEffects xmlns="" xmlns:a14="http://schemas.microsoft.com/office/drawing/2010/main">
+              <a14:hiddenEffects xmlns:a14="http://schemas.microsoft.com/office/drawing/2010/main">
                 <a:effectLst>
                   <a:outerShdw dist="35921" dir="2700000" algn="ctr" rotWithShape="0">
                     <a:schemeClr val="bg2"/>
@@ -4952,15 +4960,7 @@
             </a:pPr>
             <a:r>
               <a:rPr lang="en-US" sz="2000" dirty="0" smtClean="0"/>
-              <a:t>And </a:t>
-            </a:r>
-            <a:r>
-              <a:rPr lang="en-US" sz="2000" dirty="0" smtClean="0"/>
-              <a:t>the output of the planner is</a:t>
-            </a:r>
-            <a:r>
-              <a:rPr lang="en-US" sz="2000" dirty="0" smtClean="0"/>
-              <a:t>:</a:t>
+              <a:t>And the output of the planner is:</a:t>
             </a:r>
           </a:p>
           <a:p>
@@ -4974,11 +4974,7 @@
             </a:pPr>
             <a:r>
               <a:rPr lang="en-US" sz="1700" i="1" dirty="0" smtClean="0"/>
-              <a:t>“</a:t>
-            </a:r>
-            <a:r>
-              <a:rPr lang="en-US" sz="1700" i="1" dirty="0" smtClean="0"/>
-              <a:t>Plan: pick,2 drop,1”  where 2 is the position of the black ball (Stack 2) and 1 the position of the red box (Stack 1)</a:t>
+              <a:t>“Plan: pick,2 drop,1”  where 2 is the position of the black ball (Stack 2) and 1 the position of the red box (Stack 1)</a:t>
             </a:r>
             <a:r>
               <a:rPr lang="en-GB" sz="2200" i="1" dirty="0"/>
@@ -5041,7 +5037,7 @@
     </p:spTree>
     <p:extLst>
       <p:ext uri="{BB962C8B-B14F-4D97-AF65-F5344CB8AC3E}">
-        <p14:creationId xmlns="" xmlns:p14="http://schemas.microsoft.com/office/powerpoint/2010/main" val="464845552"/>
+        <p14:creationId xmlns:p14="http://schemas.microsoft.com/office/powerpoint/2010/main" val="464845552"/>
       </p:ext>
     </p:extLst>
   </p:cSld>
@@ -5211,7 +5207,7 @@
     </p:spTree>
     <p:extLst>
       <p:ext uri="{BB962C8B-B14F-4D97-AF65-F5344CB8AC3E}">
-        <p14:creationId xmlns="" xmlns:p14="http://schemas.microsoft.com/office/powerpoint/2010/main" val="92392103"/>
+        <p14:creationId xmlns:p14="http://schemas.microsoft.com/office/powerpoint/2010/main" val="92392103"/>
       </p:ext>
     </p:extLst>
   </p:cSld>
@@ -5691,7 +5687,7 @@
     </p:custDataLst>
     <p:extLst>
       <p:ext uri="{BB962C8B-B14F-4D97-AF65-F5344CB8AC3E}">
-        <p14:creationId xmlns="" xmlns:p14="http://schemas.microsoft.com/office/powerpoint/2010/main" val="1022584412"/>
+        <p14:creationId xmlns:p14="http://schemas.microsoft.com/office/powerpoint/2010/main" val="1022584412"/>
       </p:ext>
     </p:extLst>
   </p:cSld>
@@ -5903,14 +5899,14 @@
           <a:effectLst/>
           <a:extLst>
             <a:ext uri="{909E8E84-426E-40DD-AFC4-6F175D3DCCD1}">
-              <a14:hiddenFill xmlns="" xmlns:a14="http://schemas.microsoft.com/office/drawing/2010/main">
+              <a14:hiddenFill xmlns:a14="http://schemas.microsoft.com/office/drawing/2010/main">
                 <a:solidFill>
                   <a:srgbClr val="C0C0C0"/>
                 </a:solidFill>
               </a14:hiddenFill>
             </a:ext>
             <a:ext uri="{91240B29-F687-4F45-9708-019B960494DF}">
-              <a14:hiddenLine xmlns="" xmlns:a14="http://schemas.microsoft.com/office/drawing/2010/main" w="9525">
+              <a14:hiddenLine xmlns:a14="http://schemas.microsoft.com/office/drawing/2010/main" w="9525">
                 <a:solidFill>
                   <a:srgbClr val="5F5F5F"/>
                 </a:solidFill>
@@ -5920,7 +5916,7 @@
               </a14:hiddenLine>
             </a:ext>
             <a:ext uri="{AF507438-7753-43E0-B8FC-AC1667EBCBE1}">
-              <a14:hiddenEffects xmlns="" xmlns:a14="http://schemas.microsoft.com/office/drawing/2010/main">
+              <a14:hiddenEffects xmlns:a14="http://schemas.microsoft.com/office/drawing/2010/main">
                 <a:effectLst>
                   <a:outerShdw dist="35921" dir="2700000" algn="ctr" rotWithShape="0">
                     <a:schemeClr val="bg2"/>
@@ -6154,7 +6150,7 @@
     </p:spTree>
     <p:extLst>
       <p:ext uri="{BB962C8B-B14F-4D97-AF65-F5344CB8AC3E}">
-        <p14:creationId xmlns="" xmlns:p14="http://schemas.microsoft.com/office/powerpoint/2010/main" val="3489243514"/>
+        <p14:creationId xmlns:p14="http://schemas.microsoft.com/office/powerpoint/2010/main" val="3489243514"/>
       </p:ext>
     </p:extLst>
   </p:cSld>
@@ -6634,7 +6630,7 @@
     </p:custDataLst>
     <p:extLst>
       <p:ext uri="{BB962C8B-B14F-4D97-AF65-F5344CB8AC3E}">
-        <p14:creationId xmlns="" xmlns:p14="http://schemas.microsoft.com/office/powerpoint/2010/main" val="59264784"/>
+        <p14:creationId xmlns:p14="http://schemas.microsoft.com/office/powerpoint/2010/main" val="59264784"/>
       </p:ext>
     </p:extLst>
   </p:cSld>
@@ -6806,7 +6802,7 @@
     </p:spTree>
     <p:extLst>
       <p:ext uri="{BB962C8B-B14F-4D97-AF65-F5344CB8AC3E}">
-        <p14:creationId xmlns="" xmlns:p14="http://schemas.microsoft.com/office/powerpoint/2010/main" val="1008876803"/>
+        <p14:creationId xmlns:p14="http://schemas.microsoft.com/office/powerpoint/2010/main" val="1008876803"/>
       </p:ext>
     </p:extLst>
   </p:cSld>
@@ -7286,7 +7282,7 @@
     </p:custDataLst>
     <p:extLst>
       <p:ext uri="{BB962C8B-B14F-4D97-AF65-F5344CB8AC3E}">
-        <p14:creationId xmlns="" xmlns:p14="http://schemas.microsoft.com/office/powerpoint/2010/main" val="1294863535"/>
+        <p14:creationId xmlns:p14="http://schemas.microsoft.com/office/powerpoint/2010/main" val="1294863535"/>
       </p:ext>
     </p:extLst>
   </p:cSld>
@@ -7538,7 +7534,7 @@
     </p:spTree>
     <p:extLst>
       <p:ext uri="{BB962C8B-B14F-4D97-AF65-F5344CB8AC3E}">
-        <p14:creationId xmlns="" xmlns:p14="http://schemas.microsoft.com/office/powerpoint/2010/main" val="2242799157"/>
+        <p14:creationId xmlns:p14="http://schemas.microsoft.com/office/powerpoint/2010/main" val="2242799157"/>
       </p:ext>
     </p:extLst>
   </p:cSld>
@@ -8018,7 +8014,7 @@
     </p:custDataLst>
     <p:extLst>
       <p:ext uri="{BB962C8B-B14F-4D97-AF65-F5344CB8AC3E}">
-        <p14:creationId xmlns="" xmlns:p14="http://schemas.microsoft.com/office/powerpoint/2010/main" val="3974514376"/>
+        <p14:creationId xmlns:p14="http://schemas.microsoft.com/office/powerpoint/2010/main" val="3974514376"/>
       </p:ext>
     </p:extLst>
   </p:cSld>
@@ -8132,11 +8128,7 @@
             </a:r>
             <a:r>
               <a:rPr lang="en-US" sz="1848" dirty="0" smtClean="0"/>
-              <a:t> </a:t>
-            </a:r>
-            <a:r>
-              <a:rPr lang="en-US" sz="1848" dirty="0" smtClean="0"/>
-              <a:t>and </a:t>
+              <a:t> and </a:t>
             </a:r>
             <a:r>
               <a:rPr lang="en-US" sz="1848" b="1" dirty="0" smtClean="0">
@@ -8173,11 +8165,7 @@
             </a:pPr>
             <a:r>
               <a:rPr lang="en-US" sz="1540" i="1" dirty="0" smtClean="0"/>
-              <a:t>Colors: </a:t>
-            </a:r>
-            <a:r>
-              <a:rPr lang="en-US" sz="1540" i="1" dirty="0" smtClean="0"/>
-              <a:t>red, black, blue, green, yellow, white. </a:t>
+              <a:t>Colors: red, black, blue, green, yellow, white. </a:t>
             </a:r>
             <a:endParaRPr lang="en-US" sz="1848" dirty="0" smtClean="0"/>
           </a:p>
@@ -8299,7 +8287,7 @@
           </a:ln>
           <a:extLst>
             <a:ext uri="{C572A759-6A51-4108-AA02-DFA0A04FC94B}">
-              <ma14:wrappingTextBoxFlag xmlns="" xmlns:ma14="http://schemas.microsoft.com/office/mac/drawingml/2011/main" val="1"/>
+              <ma14:wrappingTextBoxFlag xmlns:ma14="http://schemas.microsoft.com/office/mac/drawingml/2011/main" xmlns="" val="1"/>
             </a:ext>
           </a:extLst>
         </p:spPr>
@@ -8338,7 +8326,7 @@
     </p:spTree>
     <p:extLst>
       <p:ext uri="{BB962C8B-B14F-4D97-AF65-F5344CB8AC3E}">
-        <p14:creationId xmlns="" xmlns:p14="http://schemas.microsoft.com/office/powerpoint/2010/main" val="1099653964"/>
+        <p14:creationId xmlns:p14="http://schemas.microsoft.com/office/powerpoint/2010/main" val="1099653964"/>
       </p:ext>
     </p:extLst>
   </p:cSld>
@@ -8818,7 +8806,7 @@
     </p:custDataLst>
     <p:extLst>
       <p:ext uri="{BB962C8B-B14F-4D97-AF65-F5344CB8AC3E}">
-        <p14:creationId xmlns="" xmlns:p14="http://schemas.microsoft.com/office/powerpoint/2010/main" val="3079118635"/>
+        <p14:creationId xmlns:p14="http://schemas.microsoft.com/office/powerpoint/2010/main" val="3079118635"/>
       </p:ext>
     </p:extLst>
   </p:cSld>
@@ -8987,15 +8975,7 @@
             </a:pPr>
             <a:r>
               <a:rPr lang="en-US" sz="1800" dirty="0" smtClean="0"/>
-              <a:t>The user can also perform request to obtain </a:t>
-            </a:r>
-            <a:r>
-              <a:rPr lang="en-US" sz="1800" dirty="0" smtClean="0"/>
-              <a:t>information </a:t>
-            </a:r>
-            <a:r>
-              <a:rPr lang="en-US" sz="1800" dirty="0" smtClean="0"/>
-              <a:t>about an entire </a:t>
+              <a:t>The user can also perform request to obtain information about an entire </a:t>
             </a:r>
             <a:r>
               <a:rPr lang="en-US" sz="1800" b="1" dirty="0" smtClean="0">
@@ -9009,7 +8989,6 @@
               <a:rPr lang="en-US" sz="1800" dirty="0" smtClean="0"/>
               <a:t>.</a:t>
             </a:r>
-            <a:endParaRPr lang="en-US" sz="1800" dirty="0" smtClean="0"/>
           </a:p>
           <a:p>
             <a:pPr marL="685800" lvl="2" indent="-285750">
@@ -9048,7 +9027,7 @@
     </p:spTree>
     <p:extLst>
       <p:ext uri="{BB962C8B-B14F-4D97-AF65-F5344CB8AC3E}">
-        <p14:creationId xmlns="" xmlns:p14="http://schemas.microsoft.com/office/powerpoint/2010/main" val="427125282"/>
+        <p14:creationId xmlns:p14="http://schemas.microsoft.com/office/powerpoint/2010/main" val="427125282"/>
       </p:ext>
     </p:extLst>
   </p:cSld>
@@ -9608,7 +9587,7 @@
     </p:custDataLst>
     <p:extLst>
       <p:ext uri="{BB962C8B-B14F-4D97-AF65-F5344CB8AC3E}">
-        <p14:creationId xmlns="" xmlns:p14="http://schemas.microsoft.com/office/powerpoint/2010/main" val="1123953762"/>
+        <p14:creationId xmlns:p14="http://schemas.microsoft.com/office/powerpoint/2010/main" val="1123953762"/>
       </p:ext>
     </p:extLst>
   </p:cSld>
@@ -9866,8 +9845,77 @@
                   <a:srgbClr val="5F5F5F"/>
                 </a:solidFill>
               </a:rPr>
-              <a:t>Handle the any or all cases for basic entities. </a:t>
-            </a:r>
+              <a:t>Handle </a:t>
+            </a:r>
+            <a:r>
+              <a:rPr kumimoji="1" lang="en-GB" sz="2000" b="1" i="1" dirty="0" smtClean="0">
+                <a:solidFill>
+                  <a:srgbClr val="5F5F5F"/>
+                </a:solidFill>
+              </a:rPr>
+              <a:t>the</a:t>
+            </a:r>
+            <a:r>
+              <a:rPr kumimoji="1" lang="en-GB" sz="2000" i="1" dirty="0" smtClean="0">
+                <a:solidFill>
+                  <a:srgbClr val="5F5F5F"/>
+                </a:solidFill>
+              </a:rPr>
+              <a:t>,</a:t>
+            </a:r>
+            <a:r>
+              <a:rPr kumimoji="1" lang="en-GB" sz="2000" b="1" i="1" dirty="0" smtClean="0">
+                <a:solidFill>
+                  <a:srgbClr val="5F5F5F"/>
+                </a:solidFill>
+              </a:rPr>
+              <a:t> </a:t>
+            </a:r>
+            <a:r>
+              <a:rPr kumimoji="1" lang="en-GB" sz="2000" b="1" i="1" dirty="0" smtClean="0">
+                <a:solidFill>
+                  <a:srgbClr val="5F5F5F"/>
+                </a:solidFill>
+              </a:rPr>
+              <a:t>any </a:t>
+            </a:r>
+            <a:r>
+              <a:rPr kumimoji="1" lang="en-GB" sz="2000" i="1" dirty="0" smtClean="0">
+                <a:solidFill>
+                  <a:srgbClr val="5F5F5F"/>
+                </a:solidFill>
+              </a:rPr>
+              <a:t>or </a:t>
+            </a:r>
+            <a:r>
+              <a:rPr kumimoji="1" lang="en-GB" sz="2000" b="1" i="1" dirty="0" smtClean="0">
+                <a:solidFill>
+                  <a:srgbClr val="5F5F5F"/>
+                </a:solidFill>
+              </a:rPr>
+              <a:t>all</a:t>
+            </a:r>
+            <a:r>
+              <a:rPr kumimoji="1" lang="en-GB" sz="2000" i="1" dirty="0" smtClean="0">
+                <a:solidFill>
+                  <a:srgbClr val="5F5F5F"/>
+                </a:solidFill>
+              </a:rPr>
+              <a:t> </a:t>
+            </a:r>
+            <a:r>
+              <a:rPr kumimoji="1" lang="en-GB" sz="2000" i="1" dirty="0" smtClean="0">
+                <a:solidFill>
+                  <a:srgbClr val="5F5F5F"/>
+                </a:solidFill>
+              </a:rPr>
+              <a:t>cases. </a:t>
+            </a:r>
+            <a:endParaRPr kumimoji="1" lang="en-GB" sz="2000" i="1" dirty="0" smtClean="0">
+              <a:solidFill>
+                <a:srgbClr val="5F5F5F"/>
+              </a:solidFill>
+            </a:endParaRPr>
           </a:p>
           <a:p>
             <a:pPr marL="685800" lvl="2" indent="-285750" fontAlgn="base">
@@ -9968,7 +10016,7 @@
     </p:spTree>
     <p:extLst>
       <p:ext uri="{BB962C8B-B14F-4D97-AF65-F5344CB8AC3E}">
-        <p14:creationId xmlns="" xmlns:p14="http://schemas.microsoft.com/office/powerpoint/2010/main" val="566941740"/>
+        <p14:creationId xmlns:p14="http://schemas.microsoft.com/office/powerpoint/2010/main" val="566941740"/>
       </p:ext>
     </p:extLst>
   </p:cSld>

</xml_diff>

<commit_message>
specify that we are using prolog
</commit_message>
<xml_diff>
--- a/Report/AI.pptx
+++ b/Report/AI.pptx
@@ -6630,7 +6630,7 @@
         </p:nvSpPr>
         <p:spPr>
           <a:xfrm>
-            <a:off x="457200" y="4267200"/>
+            <a:off x="457200" y="4389437"/>
             <a:ext cx="8229600" cy="1858963"/>
           </a:xfrm>
         </p:spPr>
@@ -6659,8 +6659,47 @@
           <a:p>
             <a:r>
               <a:rPr lang="en-GB" sz="2400" dirty="0" smtClean="0"/>
-              <a:t>On server side: Parser, Interpreter, Planner, Solver</a:t>
-            </a:r>
+              <a:t>On server side: Parser, Interpreter, Planner, </a:t>
+            </a:r>
+            <a:r>
+              <a:rPr lang="en-GB" sz="2400" dirty="0" smtClean="0"/>
+              <a:t>Solver</a:t>
+            </a:r>
+          </a:p>
+          <a:p>
+            <a:r>
+              <a:rPr lang="en-GB" dirty="0" smtClean="0"/>
+              <a:t>We used </a:t>
+            </a:r>
+            <a:r>
+              <a:rPr lang="en-GB" b="1" dirty="0" err="1">
+                <a:solidFill>
+                  <a:schemeClr val="tx2"/>
+                </a:solidFill>
+              </a:rPr>
+              <a:t>P</a:t>
+            </a:r>
+            <a:r>
+              <a:rPr lang="en-GB" b="1" dirty="0" err="1" smtClean="0">
+                <a:solidFill>
+                  <a:schemeClr val="tx2"/>
+                </a:solidFill>
+              </a:rPr>
+              <a:t>rolog</a:t>
+            </a:r>
+            <a:r>
+              <a:rPr lang="en-GB" dirty="0" smtClean="0">
+                <a:solidFill>
+                  <a:schemeClr val="tx2"/>
+                </a:solidFill>
+              </a:rPr>
+              <a:t> </a:t>
+            </a:r>
+            <a:r>
+              <a:rPr lang="en-GB" dirty="0" smtClean="0"/>
+              <a:t>for the project</a:t>
+            </a:r>
+            <a:endParaRPr lang="en-GB" sz="2400" dirty="0" smtClean="0"/>
           </a:p>
         </p:txBody>
       </p:sp>

</xml_diff>